<commit_message>
Add AGILE to PPT
</commit_message>
<xml_diff>
--- a/Projet FFRA Diginamic.pptx
+++ b/Projet FFRA Diginamic.pptx
@@ -14,6 +14,10 @@
     <p:sldId id="259" r:id="rId9"/>
     <p:sldId id="260" r:id="rId10"/>
     <p:sldId id="261" r:id="rId11"/>
+    <p:sldId id="262" r:id="rId12"/>
+    <p:sldId id="263" r:id="rId13"/>
+    <p:sldId id="264" r:id="rId14"/>
+    <p:sldId id="265" r:id="rId15"/>
   </p:sldIdLst>
   <p:sldSz cy="5143500" cx="9144000"/>
   <p:notesSz cx="6858000" cy="9144000"/>
@@ -790,6 +794,105 @@
 </p:notes>
 </file>
 
+<file path=ppt/notesSlides/notesSlide10.xml><?xml version="1.0" encoding="utf-8"?>
+<p:notes xmlns:a="http://schemas.openxmlformats.org/drawingml/2006/main" xmlns:r="http://schemas.openxmlformats.org/officeDocument/2006/relationships" xmlns:mc="http://schemas.openxmlformats.org/markup-compatibility/2006" xmlns:mv="urn:schemas-microsoft-com:mac:vml" xmlns:p="http://schemas.openxmlformats.org/presentationml/2006/main" xmlns:c="http://schemas.openxmlformats.org/drawingml/2006/chart" xmlns:dgm="http://schemas.openxmlformats.org/drawingml/2006/diagram" xmlns:o="urn:schemas-microsoft-com:office:office" xmlns:v="urn:schemas-microsoft-com:vml" xmlns:pvml="urn:schemas-microsoft-com:office:powerpoint" xmlns:com="http://schemas.openxmlformats.org/drawingml/2006/compatibility" xmlns:p14="http://schemas.microsoft.com/office/powerpoint/2010/main" xmlns:p15="http://schemas.microsoft.com/office/powerpoint/2012/main" xmlns:ahyp="http://schemas.microsoft.com/office/drawing/2018/hyperlinkcolor" showMasterPhAnim="0" showMasterSp="0">
+  <p:cSld>
+    <p:spTree>
+      <p:nvGrpSpPr>
+        <p:cNvPr id="105" name="Shape 105"/>
+        <p:cNvGrpSpPr/>
+        <p:nvPr/>
+      </p:nvGrpSpPr>
+      <p:grpSpPr>
+        <a:xfrm>
+          <a:off x="0" y="0"/>
+          <a:ext cx="0" cy="0"/>
+          <a:chOff x="0" y="0"/>
+          <a:chExt cx="0" cy="0"/>
+        </a:xfrm>
+      </p:grpSpPr>
+      <p:sp>
+        <p:nvSpPr>
+          <p:cNvPr id="106" name="Google Shape;106;g24f52ddac75_0_25:notes"/>
+          <p:cNvSpPr/>
+          <p:nvPr>
+            <p:ph idx="2" type="sldImg"/>
+          </p:nvPr>
+        </p:nvSpPr>
+        <p:spPr>
+          <a:xfrm>
+            <a:off x="381300" y="685800"/>
+            <a:ext cx="6096000" cy="3429000"/>
+          </a:xfrm>
+          <a:custGeom>
+            <a:rect b="b" l="l" r="r" t="t"/>
+            <a:pathLst>
+              <a:path extrusionOk="0" h="120000" w="120000">
+                <a:moveTo>
+                  <a:pt x="0" y="0"/>
+                </a:moveTo>
+                <a:lnTo>
+                  <a:pt x="120000" y="0"/>
+                </a:lnTo>
+                <a:lnTo>
+                  <a:pt x="120000" y="120000"/>
+                </a:lnTo>
+                <a:lnTo>
+                  <a:pt x="0" y="120000"/>
+                </a:lnTo>
+                <a:close/>
+              </a:path>
+            </a:pathLst>
+          </a:custGeom>
+        </p:spPr>
+      </p:sp>
+      <p:sp>
+        <p:nvSpPr>
+          <p:cNvPr id="107" name="Google Shape;107;g24f52ddac75_0_25:notes"/>
+          <p:cNvSpPr txBox="1"/>
+          <p:nvPr>
+            <p:ph idx="1" type="body"/>
+          </p:nvPr>
+        </p:nvSpPr>
+        <p:spPr>
+          <a:xfrm>
+            <a:off x="685800" y="4343400"/>
+            <a:ext cx="5486400" cy="4114800"/>
+          </a:xfrm>
+          <a:prstGeom prst="rect">
+            <a:avLst/>
+          </a:prstGeom>
+        </p:spPr>
+        <p:txBody>
+          <a:bodyPr anchorCtr="0" anchor="t" bIns="91425" lIns="91425" spcFirstLastPara="1" rIns="91425" wrap="square" tIns="91425">
+            <a:noAutofit/>
+          </a:bodyPr>
+          <a:lstStyle/>
+          <a:p>
+            <a:pPr indent="0" lvl="0" marL="0" rtl="0" algn="l">
+              <a:spcBef>
+                <a:spcPts val="0"/>
+              </a:spcBef>
+              <a:spcAft>
+                <a:spcPts val="0"/>
+              </a:spcAft>
+              <a:buNone/>
+            </a:pPr>
+            <a:r>
+              <a:t/>
+            </a:r>
+            <a:endParaRPr/>
+          </a:p>
+        </p:txBody>
+      </p:sp>
+    </p:spTree>
+  </p:cSld>
+  <p:clrMapOvr>
+    <a:masterClrMapping/>
+  </p:clrMapOvr>
+</p:notes>
+</file>
+
 <file path=ppt/notesSlides/notesSlide2.xml><?xml version="1.0" encoding="utf-8"?>
 <p:notes xmlns:a="http://schemas.openxmlformats.org/drawingml/2006/main" xmlns:r="http://schemas.openxmlformats.org/officeDocument/2006/relationships" xmlns:mc="http://schemas.openxmlformats.org/markup-compatibility/2006" xmlns:mv="urn:schemas-microsoft-com:mac:vml" xmlns:p="http://schemas.openxmlformats.org/presentationml/2006/main" xmlns:c="http://schemas.openxmlformats.org/drawingml/2006/chart" xmlns:dgm="http://schemas.openxmlformats.org/drawingml/2006/diagram" xmlns:o="urn:schemas-microsoft-com:office:office" xmlns:v="urn:schemas-microsoft-com:vml" xmlns:pvml="urn:schemas-microsoft-com:office:powerpoint" xmlns:com="http://schemas.openxmlformats.org/drawingml/2006/compatibility" xmlns:p14="http://schemas.microsoft.com/office/powerpoint/2010/main" xmlns:p15="http://schemas.microsoft.com/office/powerpoint/2012/main" xmlns:ahyp="http://schemas.microsoft.com/office/drawing/2018/hyperlinkcolor" showMasterPhAnim="0" showMasterSp="0">
   <p:cSld>
@@ -1241,6 +1344,303 @@
       <p:sp>
         <p:nvSpPr>
           <p:cNvPr id="83" name="Google Shape;83;g24f9981547f_1_6:notes"/>
+          <p:cNvSpPr txBox="1"/>
+          <p:nvPr>
+            <p:ph idx="1" type="body"/>
+          </p:nvPr>
+        </p:nvSpPr>
+        <p:spPr>
+          <a:xfrm>
+            <a:off x="685800" y="4343400"/>
+            <a:ext cx="5486400" cy="4114800"/>
+          </a:xfrm>
+          <a:prstGeom prst="rect">
+            <a:avLst/>
+          </a:prstGeom>
+        </p:spPr>
+        <p:txBody>
+          <a:bodyPr anchorCtr="0" anchor="t" bIns="91425" lIns="91425" spcFirstLastPara="1" rIns="91425" wrap="square" tIns="91425">
+            <a:noAutofit/>
+          </a:bodyPr>
+          <a:lstStyle/>
+          <a:p>
+            <a:pPr indent="0" lvl="0" marL="0" rtl="0" algn="l">
+              <a:spcBef>
+                <a:spcPts val="0"/>
+              </a:spcBef>
+              <a:spcAft>
+                <a:spcPts val="0"/>
+              </a:spcAft>
+              <a:buNone/>
+            </a:pPr>
+            <a:r>
+              <a:t/>
+            </a:r>
+            <a:endParaRPr/>
+          </a:p>
+        </p:txBody>
+      </p:sp>
+    </p:spTree>
+  </p:cSld>
+  <p:clrMapOvr>
+    <a:masterClrMapping/>
+  </p:clrMapOvr>
+</p:notes>
+</file>
+
+<file path=ppt/notesSlides/notesSlide7.xml><?xml version="1.0" encoding="utf-8"?>
+<p:notes xmlns:a="http://schemas.openxmlformats.org/drawingml/2006/main" xmlns:r="http://schemas.openxmlformats.org/officeDocument/2006/relationships" xmlns:mc="http://schemas.openxmlformats.org/markup-compatibility/2006" xmlns:mv="urn:schemas-microsoft-com:mac:vml" xmlns:p="http://schemas.openxmlformats.org/presentationml/2006/main" xmlns:c="http://schemas.openxmlformats.org/drawingml/2006/chart" xmlns:dgm="http://schemas.openxmlformats.org/drawingml/2006/diagram" xmlns:o="urn:schemas-microsoft-com:office:office" xmlns:v="urn:schemas-microsoft-com:vml" xmlns:pvml="urn:schemas-microsoft-com:office:powerpoint" xmlns:com="http://schemas.openxmlformats.org/drawingml/2006/compatibility" xmlns:p14="http://schemas.microsoft.com/office/powerpoint/2010/main" xmlns:p15="http://schemas.microsoft.com/office/powerpoint/2012/main" xmlns:ahyp="http://schemas.microsoft.com/office/drawing/2018/hyperlinkcolor" showMasterPhAnim="0" showMasterSp="0">
+  <p:cSld>
+    <p:spTree>
+      <p:nvGrpSpPr>
+        <p:cNvPr id="87" name="Shape 87"/>
+        <p:cNvGrpSpPr/>
+        <p:nvPr/>
+      </p:nvGrpSpPr>
+      <p:grpSpPr>
+        <a:xfrm>
+          <a:off x="0" y="0"/>
+          <a:ext cx="0" cy="0"/>
+          <a:chOff x="0" y="0"/>
+          <a:chExt cx="0" cy="0"/>
+        </a:xfrm>
+      </p:grpSpPr>
+      <p:sp>
+        <p:nvSpPr>
+          <p:cNvPr id="88" name="Google Shape;88;g24f52ddac75_0_7:notes"/>
+          <p:cNvSpPr/>
+          <p:nvPr>
+            <p:ph idx="2" type="sldImg"/>
+          </p:nvPr>
+        </p:nvSpPr>
+        <p:spPr>
+          <a:xfrm>
+            <a:off x="381300" y="685800"/>
+            <a:ext cx="6096000" cy="3429000"/>
+          </a:xfrm>
+          <a:custGeom>
+            <a:rect b="b" l="l" r="r" t="t"/>
+            <a:pathLst>
+              <a:path extrusionOk="0" h="120000" w="120000">
+                <a:moveTo>
+                  <a:pt x="0" y="0"/>
+                </a:moveTo>
+                <a:lnTo>
+                  <a:pt x="120000" y="0"/>
+                </a:lnTo>
+                <a:lnTo>
+                  <a:pt x="120000" y="120000"/>
+                </a:lnTo>
+                <a:lnTo>
+                  <a:pt x="0" y="120000"/>
+                </a:lnTo>
+                <a:close/>
+              </a:path>
+            </a:pathLst>
+          </a:custGeom>
+        </p:spPr>
+      </p:sp>
+      <p:sp>
+        <p:nvSpPr>
+          <p:cNvPr id="89" name="Google Shape;89;g24f52ddac75_0_7:notes"/>
+          <p:cNvSpPr txBox="1"/>
+          <p:nvPr>
+            <p:ph idx="1" type="body"/>
+          </p:nvPr>
+        </p:nvSpPr>
+        <p:spPr>
+          <a:xfrm>
+            <a:off x="685800" y="4343400"/>
+            <a:ext cx="5486400" cy="4114800"/>
+          </a:xfrm>
+          <a:prstGeom prst="rect">
+            <a:avLst/>
+          </a:prstGeom>
+        </p:spPr>
+        <p:txBody>
+          <a:bodyPr anchorCtr="0" anchor="t" bIns="91425" lIns="91425" spcFirstLastPara="1" rIns="91425" wrap="square" tIns="91425">
+            <a:noAutofit/>
+          </a:bodyPr>
+          <a:lstStyle/>
+          <a:p>
+            <a:pPr indent="0" lvl="0" marL="0" rtl="0" algn="l">
+              <a:spcBef>
+                <a:spcPts val="0"/>
+              </a:spcBef>
+              <a:spcAft>
+                <a:spcPts val="0"/>
+              </a:spcAft>
+              <a:buNone/>
+            </a:pPr>
+            <a:r>
+              <a:t/>
+            </a:r>
+            <a:endParaRPr/>
+          </a:p>
+        </p:txBody>
+      </p:sp>
+    </p:spTree>
+  </p:cSld>
+  <p:clrMapOvr>
+    <a:masterClrMapping/>
+  </p:clrMapOvr>
+</p:notes>
+</file>
+
+<file path=ppt/notesSlides/notesSlide8.xml><?xml version="1.0" encoding="utf-8"?>
+<p:notes xmlns:a="http://schemas.openxmlformats.org/drawingml/2006/main" xmlns:r="http://schemas.openxmlformats.org/officeDocument/2006/relationships" xmlns:mc="http://schemas.openxmlformats.org/markup-compatibility/2006" xmlns:mv="urn:schemas-microsoft-com:mac:vml" xmlns:p="http://schemas.openxmlformats.org/presentationml/2006/main" xmlns:c="http://schemas.openxmlformats.org/drawingml/2006/chart" xmlns:dgm="http://schemas.openxmlformats.org/drawingml/2006/diagram" xmlns:o="urn:schemas-microsoft-com:office:office" xmlns:v="urn:schemas-microsoft-com:vml" xmlns:pvml="urn:schemas-microsoft-com:office:powerpoint" xmlns:com="http://schemas.openxmlformats.org/drawingml/2006/compatibility" xmlns:p14="http://schemas.microsoft.com/office/powerpoint/2010/main" xmlns:p15="http://schemas.microsoft.com/office/powerpoint/2012/main" xmlns:ahyp="http://schemas.microsoft.com/office/drawing/2018/hyperlinkcolor" showMasterPhAnim="0" showMasterSp="0">
+  <p:cSld>
+    <p:spTree>
+      <p:nvGrpSpPr>
+        <p:cNvPr id="93" name="Shape 93"/>
+        <p:cNvGrpSpPr/>
+        <p:nvPr/>
+      </p:nvGrpSpPr>
+      <p:grpSpPr>
+        <a:xfrm>
+          <a:off x="0" y="0"/>
+          <a:ext cx="0" cy="0"/>
+          <a:chOff x="0" y="0"/>
+          <a:chExt cx="0" cy="0"/>
+        </a:xfrm>
+      </p:grpSpPr>
+      <p:sp>
+        <p:nvSpPr>
+          <p:cNvPr id="94" name="Google Shape;94;g24f52ddac75_0_12:notes"/>
+          <p:cNvSpPr/>
+          <p:nvPr>
+            <p:ph idx="2" type="sldImg"/>
+          </p:nvPr>
+        </p:nvSpPr>
+        <p:spPr>
+          <a:xfrm>
+            <a:off x="381300" y="685800"/>
+            <a:ext cx="6096000" cy="3429000"/>
+          </a:xfrm>
+          <a:custGeom>
+            <a:rect b="b" l="l" r="r" t="t"/>
+            <a:pathLst>
+              <a:path extrusionOk="0" h="120000" w="120000">
+                <a:moveTo>
+                  <a:pt x="0" y="0"/>
+                </a:moveTo>
+                <a:lnTo>
+                  <a:pt x="120000" y="0"/>
+                </a:lnTo>
+                <a:lnTo>
+                  <a:pt x="120000" y="120000"/>
+                </a:lnTo>
+                <a:lnTo>
+                  <a:pt x="0" y="120000"/>
+                </a:lnTo>
+                <a:close/>
+              </a:path>
+            </a:pathLst>
+          </a:custGeom>
+        </p:spPr>
+      </p:sp>
+      <p:sp>
+        <p:nvSpPr>
+          <p:cNvPr id="95" name="Google Shape;95;g24f52ddac75_0_12:notes"/>
+          <p:cNvSpPr txBox="1"/>
+          <p:nvPr>
+            <p:ph idx="1" type="body"/>
+          </p:nvPr>
+        </p:nvSpPr>
+        <p:spPr>
+          <a:xfrm>
+            <a:off x="685800" y="4343400"/>
+            <a:ext cx="5486400" cy="4114800"/>
+          </a:xfrm>
+          <a:prstGeom prst="rect">
+            <a:avLst/>
+          </a:prstGeom>
+        </p:spPr>
+        <p:txBody>
+          <a:bodyPr anchorCtr="0" anchor="t" bIns="91425" lIns="91425" spcFirstLastPara="1" rIns="91425" wrap="square" tIns="91425">
+            <a:noAutofit/>
+          </a:bodyPr>
+          <a:lstStyle/>
+          <a:p>
+            <a:pPr indent="0" lvl="0" marL="0" rtl="0" algn="l">
+              <a:spcBef>
+                <a:spcPts val="0"/>
+              </a:spcBef>
+              <a:spcAft>
+                <a:spcPts val="0"/>
+              </a:spcAft>
+              <a:buNone/>
+            </a:pPr>
+            <a:r>
+              <a:t/>
+            </a:r>
+            <a:endParaRPr/>
+          </a:p>
+        </p:txBody>
+      </p:sp>
+    </p:spTree>
+  </p:cSld>
+  <p:clrMapOvr>
+    <a:masterClrMapping/>
+  </p:clrMapOvr>
+</p:notes>
+</file>
+
+<file path=ppt/notesSlides/notesSlide9.xml><?xml version="1.0" encoding="utf-8"?>
+<p:notes xmlns:a="http://schemas.openxmlformats.org/drawingml/2006/main" xmlns:r="http://schemas.openxmlformats.org/officeDocument/2006/relationships" xmlns:mc="http://schemas.openxmlformats.org/markup-compatibility/2006" xmlns:mv="urn:schemas-microsoft-com:mac:vml" xmlns:p="http://schemas.openxmlformats.org/presentationml/2006/main" xmlns:c="http://schemas.openxmlformats.org/drawingml/2006/chart" xmlns:dgm="http://schemas.openxmlformats.org/drawingml/2006/diagram" xmlns:o="urn:schemas-microsoft-com:office:office" xmlns:v="urn:schemas-microsoft-com:vml" xmlns:pvml="urn:schemas-microsoft-com:office:powerpoint" xmlns:com="http://schemas.openxmlformats.org/drawingml/2006/compatibility" xmlns:p14="http://schemas.microsoft.com/office/powerpoint/2010/main" xmlns:p15="http://schemas.microsoft.com/office/powerpoint/2012/main" xmlns:ahyp="http://schemas.microsoft.com/office/drawing/2018/hyperlinkcolor" showMasterPhAnim="0" showMasterSp="0">
+  <p:cSld>
+    <p:spTree>
+      <p:nvGrpSpPr>
+        <p:cNvPr id="99" name="Shape 99"/>
+        <p:cNvGrpSpPr/>
+        <p:nvPr/>
+      </p:nvGrpSpPr>
+      <p:grpSpPr>
+        <a:xfrm>
+          <a:off x="0" y="0"/>
+          <a:ext cx="0" cy="0"/>
+          <a:chOff x="0" y="0"/>
+          <a:chExt cx="0" cy="0"/>
+        </a:xfrm>
+      </p:grpSpPr>
+      <p:sp>
+        <p:nvSpPr>
+          <p:cNvPr id="100" name="Google Shape;100;g24f52ddac75_0_19:notes"/>
+          <p:cNvSpPr/>
+          <p:nvPr>
+            <p:ph idx="2" type="sldImg"/>
+          </p:nvPr>
+        </p:nvSpPr>
+        <p:spPr>
+          <a:xfrm>
+            <a:off x="381300" y="685800"/>
+            <a:ext cx="6096000" cy="3429000"/>
+          </a:xfrm>
+          <a:custGeom>
+            <a:rect b="b" l="l" r="r" t="t"/>
+            <a:pathLst>
+              <a:path extrusionOk="0" h="120000" w="120000">
+                <a:moveTo>
+                  <a:pt x="0" y="0"/>
+                </a:moveTo>
+                <a:lnTo>
+                  <a:pt x="120000" y="0"/>
+                </a:lnTo>
+                <a:lnTo>
+                  <a:pt x="120000" y="120000"/>
+                </a:lnTo>
+                <a:lnTo>
+                  <a:pt x="0" y="120000"/>
+                </a:lnTo>
+                <a:close/>
+              </a:path>
+            </a:pathLst>
+          </a:custGeom>
+        </p:spPr>
+      </p:sp>
+      <p:sp>
+        <p:nvSpPr>
+          <p:cNvPr id="101" name="Google Shape;101;g24f52ddac75_0_19:notes"/>
           <p:cNvSpPr txBox="1"/>
           <p:nvPr>
             <p:ph idx="1" type="body"/>
@@ -6130,6 +6530,180 @@
 </p:sld>
 </file>
 
+<file path=ppt/slides/slide10.xml><?xml version="1.0" encoding="utf-8"?>
+<p:sld xmlns:a="http://schemas.openxmlformats.org/drawingml/2006/main" xmlns:r="http://schemas.openxmlformats.org/officeDocument/2006/relationships" xmlns:mc="http://schemas.openxmlformats.org/markup-compatibility/2006" xmlns:mv="urn:schemas-microsoft-com:mac:vml" xmlns:p="http://schemas.openxmlformats.org/presentationml/2006/main" xmlns:c="http://schemas.openxmlformats.org/drawingml/2006/chart" xmlns:dgm="http://schemas.openxmlformats.org/drawingml/2006/diagram" xmlns:o="urn:schemas-microsoft-com:office:office" xmlns:v="urn:schemas-microsoft-com:vml" xmlns:pvml="urn:schemas-microsoft-com:office:powerpoint" xmlns:com="http://schemas.openxmlformats.org/drawingml/2006/compatibility" xmlns:p14="http://schemas.microsoft.com/office/powerpoint/2010/main" xmlns:p15="http://schemas.microsoft.com/office/powerpoint/2012/main" xmlns:ahyp="http://schemas.microsoft.com/office/drawing/2018/hyperlinkcolor">
+  <p:cSld>
+    <p:spTree>
+      <p:nvGrpSpPr>
+        <p:cNvPr id="108" name="Shape 108"/>
+        <p:cNvGrpSpPr/>
+        <p:nvPr/>
+      </p:nvGrpSpPr>
+      <p:grpSpPr>
+        <a:xfrm>
+          <a:off x="0" y="0"/>
+          <a:ext cx="0" cy="0"/>
+          <a:chOff x="0" y="0"/>
+          <a:chExt cx="0" cy="0"/>
+        </a:xfrm>
+      </p:grpSpPr>
+      <p:sp>
+        <p:nvSpPr>
+          <p:cNvPr id="109" name="Google Shape;109;p22"/>
+          <p:cNvSpPr txBox="1"/>
+          <p:nvPr>
+            <p:ph type="title"/>
+          </p:nvPr>
+        </p:nvSpPr>
+        <p:spPr>
+          <a:xfrm>
+            <a:off x="311700" y="445025"/>
+            <a:ext cx="8520600" cy="572700"/>
+          </a:xfrm>
+          <a:prstGeom prst="rect">
+            <a:avLst/>
+          </a:prstGeom>
+        </p:spPr>
+        <p:txBody>
+          <a:bodyPr anchorCtr="0" anchor="t" bIns="91425" lIns="91425" spcFirstLastPara="1" rIns="91425" wrap="square" tIns="91425">
+            <a:normAutofit fontScale="90000"/>
+          </a:bodyPr>
+          <a:lstStyle/>
+          <a:p>
+            <a:pPr indent="0" lvl="0" marL="0" rtl="0" algn="l">
+              <a:spcBef>
+                <a:spcPts val="0"/>
+              </a:spcBef>
+              <a:spcAft>
+                <a:spcPts val="0"/>
+              </a:spcAft>
+              <a:buNone/>
+            </a:pPr>
+            <a:r>
+              <a:rPr lang="fr"/>
+              <a:t>Quelles pratiques mettez-vous en place ?</a:t>
+            </a:r>
+            <a:endParaRPr/>
+          </a:p>
+        </p:txBody>
+      </p:sp>
+      <p:sp>
+        <p:nvSpPr>
+          <p:cNvPr id="110" name="Google Shape;110;p22"/>
+          <p:cNvSpPr txBox="1"/>
+          <p:nvPr>
+            <p:ph idx="1" type="body"/>
+          </p:nvPr>
+        </p:nvSpPr>
+        <p:spPr>
+          <a:xfrm>
+            <a:off x="311700" y="1152475"/>
+            <a:ext cx="8520600" cy="3416400"/>
+          </a:xfrm>
+          <a:prstGeom prst="rect">
+            <a:avLst/>
+          </a:prstGeom>
+        </p:spPr>
+        <p:txBody>
+          <a:bodyPr anchorCtr="0" anchor="ctr" bIns="91425" lIns="91425" spcFirstLastPara="1" rIns="91425" wrap="square" tIns="91425">
+            <a:normAutofit/>
+          </a:bodyPr>
+          <a:lstStyle/>
+          <a:p>
+            <a:pPr indent="-342900" lvl="0" marL="457200" rtl="0" algn="l">
+              <a:spcBef>
+                <a:spcPts val="0"/>
+              </a:spcBef>
+              <a:spcAft>
+                <a:spcPts val="0"/>
+              </a:spcAft>
+              <a:buSzPts val="1800"/>
+              <a:buChar char="-"/>
+            </a:pPr>
+            <a:r>
+              <a:rPr lang="fr"/>
+              <a:t>L’organisation de réunion courte mais efficace pour voir l’évolution du projet et des équipes de développement (daily)</a:t>
+            </a:r>
+            <a:endParaRPr/>
+          </a:p>
+          <a:p>
+            <a:pPr indent="-342900" lvl="0" marL="457200" rtl="0" algn="l">
+              <a:spcBef>
+                <a:spcPts val="0"/>
+              </a:spcBef>
+              <a:spcAft>
+                <a:spcPts val="0"/>
+              </a:spcAft>
+              <a:buSzPts val="1800"/>
+              <a:buChar char="-"/>
+            </a:pPr>
+            <a:r>
+              <a:rPr lang="fr"/>
+              <a:t>Gestion du backlog et mise en place des différentes users stories, avec le client</a:t>
+            </a:r>
+            <a:endParaRPr/>
+          </a:p>
+          <a:p>
+            <a:pPr indent="-342900" lvl="0" marL="457200" rtl="0" algn="l">
+              <a:spcBef>
+                <a:spcPts val="0"/>
+              </a:spcBef>
+              <a:spcAft>
+                <a:spcPts val="0"/>
+              </a:spcAft>
+              <a:buSzPts val="1800"/>
+              <a:buChar char="-"/>
+            </a:pPr>
+            <a:r>
+              <a:rPr lang="fr"/>
+              <a:t>L’application d’itération courte afin d’une livraison continue</a:t>
+            </a:r>
+            <a:endParaRPr/>
+          </a:p>
+          <a:p>
+            <a:pPr indent="-342900" lvl="0" marL="457200" rtl="0" algn="l">
+              <a:spcBef>
+                <a:spcPts val="0"/>
+              </a:spcBef>
+              <a:spcAft>
+                <a:spcPts val="0"/>
+              </a:spcAft>
+              <a:buSzPts val="1800"/>
+              <a:buChar char="-"/>
+            </a:pPr>
+            <a:r>
+              <a:rPr lang="fr"/>
+              <a:t>Des rétrospectives régulières, feedback et tests continus</a:t>
+            </a:r>
+            <a:endParaRPr/>
+          </a:p>
+          <a:p>
+            <a:pPr indent="-342900" lvl="0" marL="457200" rtl="0" algn="l">
+              <a:spcBef>
+                <a:spcPts val="0"/>
+              </a:spcBef>
+              <a:spcAft>
+                <a:spcPts val="0"/>
+              </a:spcAft>
+              <a:buSzPts val="1800"/>
+              <a:buChar char="-"/>
+            </a:pPr>
+            <a:r>
+              <a:rPr lang="fr"/>
+              <a:t>Mise en place d’un poker planning pour estimer les temps par tâches</a:t>
+            </a:r>
+            <a:endParaRPr/>
+          </a:p>
+        </p:txBody>
+      </p:sp>
+    </p:spTree>
+  </p:cSld>
+  <p:clrMapOvr>
+    <a:masterClrMapping/>
+  </p:clrMapOvr>
+</p:sld>
+</file>
+
 <file path=ppt/slides/slide2.xml><?xml version="1.0" encoding="utf-8"?>
 <p:sld xmlns:a="http://schemas.openxmlformats.org/drawingml/2006/main" xmlns:r="http://schemas.openxmlformats.org/officeDocument/2006/relationships" xmlns:mc="http://schemas.openxmlformats.org/markup-compatibility/2006" xmlns:mv="urn:schemas-microsoft-com:mac:vml" xmlns:p="http://schemas.openxmlformats.org/presentationml/2006/main" xmlns:c="http://schemas.openxmlformats.org/drawingml/2006/chart" xmlns:dgm="http://schemas.openxmlformats.org/drawingml/2006/diagram" xmlns:o="urn:schemas-microsoft-com:office:office" xmlns:v="urn:schemas-microsoft-com:vml" xmlns:pvml="urn:schemas-microsoft-com:office:powerpoint" xmlns:com="http://schemas.openxmlformats.org/drawingml/2006/compatibility" xmlns:p14="http://schemas.microsoft.com/office/powerpoint/2010/main" xmlns:p15="http://schemas.microsoft.com/office/powerpoint/2012/main" xmlns:ahyp="http://schemas.microsoft.com/office/drawing/2018/hyperlinkcolor">
   <p:cSld>
@@ -6613,6 +7187,564 @@
           </a:ln>
         </p:spPr>
       </p:pic>
+    </p:spTree>
+  </p:cSld>
+  <p:clrMapOvr>
+    <a:masterClrMapping/>
+  </p:clrMapOvr>
+</p:sld>
+</file>
+
+<file path=ppt/slides/slide7.xml><?xml version="1.0" encoding="utf-8"?>
+<p:sld xmlns:a="http://schemas.openxmlformats.org/drawingml/2006/main" xmlns:r="http://schemas.openxmlformats.org/officeDocument/2006/relationships" xmlns:mc="http://schemas.openxmlformats.org/markup-compatibility/2006" xmlns:mv="urn:schemas-microsoft-com:mac:vml" xmlns:p="http://schemas.openxmlformats.org/presentationml/2006/main" xmlns:c="http://schemas.openxmlformats.org/drawingml/2006/chart" xmlns:dgm="http://schemas.openxmlformats.org/drawingml/2006/diagram" xmlns:o="urn:schemas-microsoft-com:office:office" xmlns:v="urn:schemas-microsoft-com:vml" xmlns:pvml="urn:schemas-microsoft-com:office:powerpoint" xmlns:com="http://schemas.openxmlformats.org/drawingml/2006/compatibility" xmlns:p14="http://schemas.microsoft.com/office/powerpoint/2010/main" xmlns:p15="http://schemas.microsoft.com/office/powerpoint/2012/main" xmlns:ahyp="http://schemas.microsoft.com/office/drawing/2018/hyperlinkcolor">
+  <p:cSld>
+    <p:spTree>
+      <p:nvGrpSpPr>
+        <p:cNvPr id="90" name="Shape 90"/>
+        <p:cNvGrpSpPr/>
+        <p:nvPr/>
+      </p:nvGrpSpPr>
+      <p:grpSpPr>
+        <a:xfrm>
+          <a:off x="0" y="0"/>
+          <a:ext cx="0" cy="0"/>
+          <a:chOff x="0" y="0"/>
+          <a:chExt cx="0" cy="0"/>
+        </a:xfrm>
+      </p:grpSpPr>
+      <p:sp>
+        <p:nvSpPr>
+          <p:cNvPr id="91" name="Google Shape;91;p19"/>
+          <p:cNvSpPr txBox="1"/>
+          <p:nvPr>
+            <p:ph type="title"/>
+          </p:nvPr>
+        </p:nvSpPr>
+        <p:spPr>
+          <a:xfrm>
+            <a:off x="311700" y="445025"/>
+            <a:ext cx="8520600" cy="572700"/>
+          </a:xfrm>
+          <a:prstGeom prst="rect">
+            <a:avLst/>
+          </a:prstGeom>
+        </p:spPr>
+        <p:txBody>
+          <a:bodyPr anchorCtr="0" anchor="t" bIns="91425" lIns="91425" spcFirstLastPara="1" rIns="91425" wrap="square" tIns="91425">
+            <a:noAutofit/>
+          </a:bodyPr>
+          <a:lstStyle/>
+          <a:p>
+            <a:pPr indent="0" lvl="0" marL="0" rtl="0" algn="l">
+              <a:spcBef>
+                <a:spcPts val="0"/>
+              </a:spcBef>
+              <a:spcAft>
+                <a:spcPts val="0"/>
+              </a:spcAft>
+              <a:buSzPts val="990"/>
+              <a:buNone/>
+            </a:pPr>
+            <a:r>
+              <a:rPr lang="fr" sz="1720"/>
+              <a:t>Reprendre le TP d'hier en précisant en quoi une approche agile serait bénéfique ?</a:t>
+            </a:r>
+            <a:endParaRPr sz="1520"/>
+          </a:p>
+        </p:txBody>
+      </p:sp>
+      <p:sp>
+        <p:nvSpPr>
+          <p:cNvPr id="92" name="Google Shape;92;p19"/>
+          <p:cNvSpPr txBox="1"/>
+          <p:nvPr>
+            <p:ph idx="1" type="body"/>
+          </p:nvPr>
+        </p:nvSpPr>
+        <p:spPr>
+          <a:xfrm>
+            <a:off x="311700" y="1152475"/>
+            <a:ext cx="8520600" cy="3416400"/>
+          </a:xfrm>
+          <a:prstGeom prst="rect">
+            <a:avLst/>
+          </a:prstGeom>
+        </p:spPr>
+        <p:txBody>
+          <a:bodyPr anchorCtr="0" anchor="ctr" bIns="91425" lIns="91425" spcFirstLastPara="1" rIns="91425" wrap="square" tIns="91425">
+            <a:normAutofit/>
+          </a:bodyPr>
+          <a:lstStyle/>
+          <a:p>
+            <a:pPr indent="-342900" lvl="0" marL="457200" rtl="0" algn="l">
+              <a:spcBef>
+                <a:spcPts val="0"/>
+              </a:spcBef>
+              <a:spcAft>
+                <a:spcPts val="0"/>
+              </a:spcAft>
+              <a:buSzPts val="1800"/>
+              <a:buChar char="-"/>
+            </a:pPr>
+            <a:r>
+              <a:rPr lang="fr"/>
+              <a:t>Possibilité d’être plus agile quant </a:t>
+            </a:r>
+            <a:r>
+              <a:rPr lang="fr"/>
+              <a:t>à la</a:t>
+            </a:r>
+            <a:r>
+              <a:rPr lang="fr"/>
+              <a:t> modification que pourrait souhaiter le client</a:t>
+            </a:r>
+            <a:endParaRPr/>
+          </a:p>
+          <a:p>
+            <a:pPr indent="-342900" lvl="0" marL="457200" rtl="0" algn="l">
+              <a:spcBef>
+                <a:spcPts val="0"/>
+              </a:spcBef>
+              <a:spcAft>
+                <a:spcPts val="0"/>
+              </a:spcAft>
+              <a:buSzPts val="1800"/>
+              <a:buChar char="-"/>
+            </a:pPr>
+            <a:r>
+              <a:rPr lang="fr"/>
+              <a:t>Possibilité de fluidifier les différentes étapes du projet</a:t>
+            </a:r>
+            <a:endParaRPr/>
+          </a:p>
+          <a:p>
+            <a:pPr indent="-342900" lvl="0" marL="457200" rtl="0" algn="l">
+              <a:spcBef>
+                <a:spcPts val="0"/>
+              </a:spcBef>
+              <a:spcAft>
+                <a:spcPts val="0"/>
+              </a:spcAft>
+              <a:buSzPts val="1800"/>
+              <a:buChar char="-"/>
+            </a:pPr>
+            <a:r>
+              <a:rPr lang="fr"/>
+              <a:t>Implication plus grande du client dans le projet</a:t>
+            </a:r>
+            <a:endParaRPr/>
+          </a:p>
+          <a:p>
+            <a:pPr indent="-342900" lvl="0" marL="457200" rtl="0" algn="l">
+              <a:spcBef>
+                <a:spcPts val="0"/>
+              </a:spcBef>
+              <a:spcAft>
+                <a:spcPts val="0"/>
+              </a:spcAft>
+              <a:buSzPts val="1800"/>
+              <a:buChar char="-"/>
+            </a:pPr>
+            <a:r>
+              <a:rPr lang="fr"/>
+              <a:t>Transparence du produit, chaque étape est (ou non) validé par le client</a:t>
+            </a:r>
+            <a:endParaRPr/>
+          </a:p>
+          <a:p>
+            <a:pPr indent="-342900" lvl="0" marL="457200" rtl="0" algn="l">
+              <a:spcBef>
+                <a:spcPts val="0"/>
+              </a:spcBef>
+              <a:spcAft>
+                <a:spcPts val="0"/>
+              </a:spcAft>
+              <a:buSzPts val="1800"/>
+              <a:buChar char="-"/>
+            </a:pPr>
+            <a:r>
+              <a:rPr lang="fr"/>
+              <a:t>Mise à jour grâce aux itérations</a:t>
+            </a:r>
+            <a:endParaRPr/>
+          </a:p>
+        </p:txBody>
+      </p:sp>
+    </p:spTree>
+  </p:cSld>
+  <p:clrMapOvr>
+    <a:masterClrMapping/>
+  </p:clrMapOvr>
+</p:sld>
+</file>
+
+<file path=ppt/slides/slide8.xml><?xml version="1.0" encoding="utf-8"?>
+<p:sld xmlns:a="http://schemas.openxmlformats.org/drawingml/2006/main" xmlns:r="http://schemas.openxmlformats.org/officeDocument/2006/relationships" xmlns:mc="http://schemas.openxmlformats.org/markup-compatibility/2006" xmlns:mv="urn:schemas-microsoft-com:mac:vml" xmlns:p="http://schemas.openxmlformats.org/presentationml/2006/main" xmlns:c="http://schemas.openxmlformats.org/drawingml/2006/chart" xmlns:dgm="http://schemas.openxmlformats.org/drawingml/2006/diagram" xmlns:o="urn:schemas-microsoft-com:office:office" xmlns:v="urn:schemas-microsoft-com:vml" xmlns:pvml="urn:schemas-microsoft-com:office:powerpoint" xmlns:com="http://schemas.openxmlformats.org/drawingml/2006/compatibility" xmlns:p14="http://schemas.microsoft.com/office/powerpoint/2010/main" xmlns:p15="http://schemas.microsoft.com/office/powerpoint/2012/main" xmlns:ahyp="http://schemas.microsoft.com/office/drawing/2018/hyperlinkcolor">
+  <p:cSld>
+    <p:spTree>
+      <p:nvGrpSpPr>
+        <p:cNvPr id="96" name="Shape 96"/>
+        <p:cNvGrpSpPr/>
+        <p:nvPr/>
+      </p:nvGrpSpPr>
+      <p:grpSpPr>
+        <a:xfrm>
+          <a:off x="0" y="0"/>
+          <a:ext cx="0" cy="0"/>
+          <a:chOff x="0" y="0"/>
+          <a:chExt cx="0" cy="0"/>
+        </a:xfrm>
+      </p:grpSpPr>
+      <p:sp>
+        <p:nvSpPr>
+          <p:cNvPr id="97" name="Google Shape;97;p20"/>
+          <p:cNvSpPr txBox="1"/>
+          <p:nvPr>
+            <p:ph type="title"/>
+          </p:nvPr>
+        </p:nvSpPr>
+        <p:spPr>
+          <a:xfrm>
+            <a:off x="311700" y="445025"/>
+            <a:ext cx="8520600" cy="572700"/>
+          </a:xfrm>
+          <a:prstGeom prst="rect">
+            <a:avLst/>
+          </a:prstGeom>
+        </p:spPr>
+        <p:txBody>
+          <a:bodyPr anchorCtr="0" anchor="t" bIns="91425" lIns="91425" spcFirstLastPara="1" rIns="91425" wrap="square" tIns="91425">
+            <a:noAutofit/>
+          </a:bodyPr>
+          <a:lstStyle/>
+          <a:p>
+            <a:pPr indent="0" lvl="0" marL="0" rtl="0" algn="l">
+              <a:spcBef>
+                <a:spcPts val="0"/>
+              </a:spcBef>
+              <a:spcAft>
+                <a:spcPts val="0"/>
+              </a:spcAft>
+              <a:buSzPts val="990"/>
+              <a:buNone/>
+            </a:pPr>
+            <a:r>
+              <a:rPr lang="fr" sz="2320"/>
+              <a:t>Qu'est-ce qui change en passant sur le paradigme de l'agilité ?</a:t>
+            </a:r>
+            <a:endParaRPr sz="2320"/>
+          </a:p>
+        </p:txBody>
+      </p:sp>
+      <p:sp>
+        <p:nvSpPr>
+          <p:cNvPr id="98" name="Google Shape;98;p20"/>
+          <p:cNvSpPr txBox="1"/>
+          <p:nvPr>
+            <p:ph idx="1" type="body"/>
+          </p:nvPr>
+        </p:nvSpPr>
+        <p:spPr>
+          <a:xfrm>
+            <a:off x="311700" y="1152475"/>
+            <a:ext cx="8520600" cy="3416400"/>
+          </a:xfrm>
+          <a:prstGeom prst="rect">
+            <a:avLst/>
+          </a:prstGeom>
+        </p:spPr>
+        <p:txBody>
+          <a:bodyPr anchorCtr="0" anchor="ctr" bIns="91425" lIns="91425" spcFirstLastPara="1" rIns="91425" wrap="square" tIns="91425">
+            <a:normAutofit/>
+          </a:bodyPr>
+          <a:lstStyle/>
+          <a:p>
+            <a:pPr indent="-342900" lvl="0" marL="457200" rtl="0" algn="l">
+              <a:spcBef>
+                <a:spcPts val="0"/>
+              </a:spcBef>
+              <a:spcAft>
+                <a:spcPts val="0"/>
+              </a:spcAft>
+              <a:buSzPts val="1800"/>
+              <a:buChar char="-"/>
+            </a:pPr>
+            <a:r>
+              <a:rPr lang="fr"/>
+              <a:t>Ressources attribué à une tâche remplacé par l’auto-gestion de l’équipe</a:t>
+            </a:r>
+            <a:endParaRPr/>
+          </a:p>
+          <a:p>
+            <a:pPr indent="-342900" lvl="0" marL="457200" rtl="0" algn="l">
+              <a:spcBef>
+                <a:spcPts val="0"/>
+              </a:spcBef>
+              <a:spcAft>
+                <a:spcPts val="0"/>
+              </a:spcAft>
+              <a:buSzPts val="1800"/>
+              <a:buChar char="-"/>
+            </a:pPr>
+            <a:r>
+              <a:rPr lang="fr"/>
+              <a:t>Les durées sont différentes</a:t>
+            </a:r>
+            <a:endParaRPr/>
+          </a:p>
+          <a:p>
+            <a:pPr indent="-342900" lvl="0" marL="457200" rtl="0" algn="l">
+              <a:spcBef>
+                <a:spcPts val="0"/>
+              </a:spcBef>
+              <a:spcAft>
+                <a:spcPts val="0"/>
+              </a:spcAft>
+              <a:buSzPts val="1800"/>
+              <a:buChar char="-"/>
+            </a:pPr>
+            <a:r>
+              <a:rPr lang="fr"/>
+              <a:t>Des livraisons plus fréquentes</a:t>
+            </a:r>
+            <a:endParaRPr/>
+          </a:p>
+          <a:p>
+            <a:pPr indent="-342900" lvl="0" marL="457200" rtl="0" algn="l">
+              <a:spcBef>
+                <a:spcPts val="0"/>
+              </a:spcBef>
+              <a:spcAft>
+                <a:spcPts val="0"/>
+              </a:spcAft>
+              <a:buSzPts val="1800"/>
+              <a:buChar char="-"/>
+            </a:pPr>
+            <a:r>
+              <a:rPr lang="fr"/>
+              <a:t>Des réunions plus fréquentes entre les différents acteurs</a:t>
+            </a:r>
+            <a:endParaRPr/>
+          </a:p>
+          <a:p>
+            <a:pPr indent="-342900" lvl="0" marL="457200" rtl="0" algn="l">
+              <a:spcBef>
+                <a:spcPts val="0"/>
+              </a:spcBef>
+              <a:spcAft>
+                <a:spcPts val="0"/>
+              </a:spcAft>
+              <a:buSzPts val="1800"/>
+              <a:buChar char="-"/>
+            </a:pPr>
+            <a:r>
+              <a:rPr lang="fr"/>
+              <a:t>Le budget qui sera plus proche de la réalité</a:t>
+            </a:r>
+            <a:endParaRPr/>
+          </a:p>
+          <a:p>
+            <a:pPr indent="-342900" lvl="0" marL="457200" rtl="0" algn="l">
+              <a:spcBef>
+                <a:spcPts val="0"/>
+              </a:spcBef>
+              <a:spcAft>
+                <a:spcPts val="0"/>
+              </a:spcAft>
+              <a:buSzPts val="1800"/>
+              <a:buChar char="-"/>
+            </a:pPr>
+            <a:r>
+              <a:rPr lang="fr"/>
+              <a:t>La date de rendu de projet peut être différents en fonction du client</a:t>
+            </a:r>
+            <a:endParaRPr/>
+          </a:p>
+          <a:p>
+            <a:pPr indent="-342900" lvl="0" marL="457200" rtl="0" algn="l">
+              <a:spcBef>
+                <a:spcPts val="0"/>
+              </a:spcBef>
+              <a:spcAft>
+                <a:spcPts val="0"/>
+              </a:spcAft>
+              <a:buSzPts val="1800"/>
+              <a:buChar char="-"/>
+            </a:pPr>
+            <a:r>
+              <a:rPr lang="fr"/>
+              <a:t>Le cadre de projet est plus à même de bouger et donc moins de stabilité</a:t>
+            </a:r>
+            <a:endParaRPr/>
+          </a:p>
+        </p:txBody>
+      </p:sp>
+    </p:spTree>
+  </p:cSld>
+  <p:clrMapOvr>
+    <a:masterClrMapping/>
+  </p:clrMapOvr>
+</p:sld>
+</file>
+
+<file path=ppt/slides/slide9.xml><?xml version="1.0" encoding="utf-8"?>
+<p:sld xmlns:a="http://schemas.openxmlformats.org/drawingml/2006/main" xmlns:r="http://schemas.openxmlformats.org/officeDocument/2006/relationships" xmlns:mc="http://schemas.openxmlformats.org/markup-compatibility/2006" xmlns:mv="urn:schemas-microsoft-com:mac:vml" xmlns:p="http://schemas.openxmlformats.org/presentationml/2006/main" xmlns:c="http://schemas.openxmlformats.org/drawingml/2006/chart" xmlns:dgm="http://schemas.openxmlformats.org/drawingml/2006/diagram" xmlns:o="urn:schemas-microsoft-com:office:office" xmlns:v="urn:schemas-microsoft-com:vml" xmlns:pvml="urn:schemas-microsoft-com:office:powerpoint" xmlns:com="http://schemas.openxmlformats.org/drawingml/2006/compatibility" xmlns:p14="http://schemas.microsoft.com/office/powerpoint/2010/main" xmlns:p15="http://schemas.microsoft.com/office/powerpoint/2012/main" xmlns:ahyp="http://schemas.microsoft.com/office/drawing/2018/hyperlinkcolor">
+  <p:cSld>
+    <p:spTree>
+      <p:nvGrpSpPr>
+        <p:cNvPr id="102" name="Shape 102"/>
+        <p:cNvGrpSpPr/>
+        <p:nvPr/>
+      </p:nvGrpSpPr>
+      <p:grpSpPr>
+        <a:xfrm>
+          <a:off x="0" y="0"/>
+          <a:ext cx="0" cy="0"/>
+          <a:chOff x="0" y="0"/>
+          <a:chExt cx="0" cy="0"/>
+        </a:xfrm>
+      </p:grpSpPr>
+      <p:sp>
+        <p:nvSpPr>
+          <p:cNvPr id="103" name="Google Shape;103;p21"/>
+          <p:cNvSpPr txBox="1"/>
+          <p:nvPr>
+            <p:ph type="title"/>
+          </p:nvPr>
+        </p:nvSpPr>
+        <p:spPr>
+          <a:xfrm>
+            <a:off x="311700" y="445025"/>
+            <a:ext cx="8520600" cy="572700"/>
+          </a:xfrm>
+          <a:prstGeom prst="rect">
+            <a:avLst/>
+          </a:prstGeom>
+        </p:spPr>
+        <p:txBody>
+          <a:bodyPr anchorCtr="0" anchor="t" bIns="91425" lIns="91425" spcFirstLastPara="1" rIns="91425" wrap="square" tIns="91425">
+            <a:noAutofit/>
+          </a:bodyPr>
+          <a:lstStyle/>
+          <a:p>
+            <a:pPr indent="0" lvl="0" marL="0" rtl="0" algn="l">
+              <a:spcBef>
+                <a:spcPts val="0"/>
+              </a:spcBef>
+              <a:spcAft>
+                <a:spcPts val="0"/>
+              </a:spcAft>
+              <a:buSzPts val="990"/>
+              <a:buNone/>
+            </a:pPr>
+            <a:r>
+              <a:rPr lang="fr" sz="2320"/>
+              <a:t>Comment </a:t>
+            </a:r>
+            <a:r>
+              <a:rPr lang="fr" sz="2320"/>
+              <a:t>organisez-vous votre</a:t>
+            </a:r>
+            <a:r>
+              <a:rPr lang="fr" sz="2320"/>
+              <a:t> équipe avec les rôles agiles ?</a:t>
+            </a:r>
+            <a:endParaRPr sz="2320"/>
+          </a:p>
+        </p:txBody>
+      </p:sp>
+      <p:sp>
+        <p:nvSpPr>
+          <p:cNvPr id="104" name="Google Shape;104;p21"/>
+          <p:cNvSpPr txBox="1"/>
+          <p:nvPr>
+            <p:ph idx="1" type="body"/>
+          </p:nvPr>
+        </p:nvSpPr>
+        <p:spPr>
+          <a:xfrm>
+            <a:off x="311700" y="1152475"/>
+            <a:ext cx="8520600" cy="3416400"/>
+          </a:xfrm>
+          <a:prstGeom prst="rect">
+            <a:avLst/>
+          </a:prstGeom>
+        </p:spPr>
+        <p:txBody>
+          <a:bodyPr anchorCtr="0" anchor="ctr" bIns="91425" lIns="91425" spcFirstLastPara="1" rIns="91425" wrap="square" tIns="91425">
+            <a:normAutofit/>
+          </a:bodyPr>
+          <a:lstStyle/>
+          <a:p>
+            <a:pPr indent="-342900" lvl="0" marL="457200" rtl="0" algn="l">
+              <a:spcBef>
+                <a:spcPts val="0"/>
+              </a:spcBef>
+              <a:spcAft>
+                <a:spcPts val="0"/>
+              </a:spcAft>
+              <a:buSzPts val="1800"/>
+              <a:buChar char="-"/>
+            </a:pPr>
+            <a:r>
+              <a:rPr lang="fr"/>
+              <a:t>Ajout d’un PO</a:t>
+            </a:r>
+            <a:endParaRPr/>
+          </a:p>
+          <a:p>
+            <a:pPr indent="-342900" lvl="0" marL="457200" rtl="0" algn="l">
+              <a:spcBef>
+                <a:spcPts val="0"/>
+              </a:spcBef>
+              <a:spcAft>
+                <a:spcPts val="0"/>
+              </a:spcAft>
+              <a:buSzPts val="1800"/>
+              <a:buChar char="-"/>
+            </a:pPr>
+            <a:r>
+              <a:rPr lang="fr"/>
+              <a:t>L’expert data pourrait être le Scrum Master afin d’avoir une plus grande implication dans le projet</a:t>
+            </a:r>
+            <a:endParaRPr/>
+          </a:p>
+          <a:p>
+            <a:pPr indent="-342900" lvl="0" marL="457200" rtl="0" algn="l">
+              <a:spcBef>
+                <a:spcPts val="0"/>
+              </a:spcBef>
+              <a:spcAft>
+                <a:spcPts val="0"/>
+              </a:spcAft>
+              <a:buSzPts val="1800"/>
+              <a:buChar char="-"/>
+            </a:pPr>
+            <a:r>
+              <a:rPr lang="fr"/>
+              <a:t>Chef de projet et client en partie prenante </a:t>
+            </a:r>
+            <a:endParaRPr/>
+          </a:p>
+          <a:p>
+            <a:pPr indent="-342900" lvl="0" marL="457200" rtl="0" algn="l">
+              <a:spcBef>
+                <a:spcPts val="0"/>
+              </a:spcBef>
+              <a:spcAft>
+                <a:spcPts val="0"/>
+              </a:spcAft>
+              <a:buSzPts val="1800"/>
+              <a:buChar char="-"/>
+            </a:pPr>
+            <a:r>
+              <a:rPr lang="fr"/>
+              <a:t>Potentiellement un sponsor</a:t>
+            </a:r>
+            <a:endParaRPr/>
+          </a:p>
+        </p:txBody>
+      </p:sp>
     </p:spTree>
   </p:cSld>
   <p:clrMapOvr>

</xml_diff>